<commit_message>
Updated icons size to match microsoft requirements
</commit_message>
<xml_diff>
--- a/Assets/Icons/StackMeFirst Logo.pptx
+++ b/Assets/Icons/StackMeFirst Logo.pptx
@@ -3346,15 +3346,17 @@
               </a:ext>
             </a:extLst>
           </p:cNvPr>
-          <p:cNvGrpSpPr/>
+          <p:cNvGrpSpPr>
+            <a:grpSpLocks noChangeAspect="1"/>
+          </p:cNvGrpSpPr>
           <p:nvPr/>
         </p:nvGrpSpPr>
         <p:grpSpPr>
           <a:xfrm>
-            <a:off x="1880395" y="1348579"/>
-            <a:ext cx="1484977" cy="1437483"/>
-            <a:chOff x="1880395" y="1348579"/>
-            <a:chExt cx="1484977" cy="1437483"/>
+            <a:off x="375446" y="384966"/>
+            <a:ext cx="830482" cy="819817"/>
+            <a:chOff x="1880395" y="1322102"/>
+            <a:chExt cx="1483004" cy="1463960"/>
           </a:xfrm>
         </p:grpSpPr>
         <p:grpSp>
@@ -3371,10 +3373,10 @@
           </p:nvGrpSpPr>
           <p:grpSpPr>
             <a:xfrm>
-              <a:off x="2371725" y="1606790"/>
-              <a:ext cx="993647" cy="1179271"/>
-              <a:chOff x="2371725" y="1606790"/>
-              <a:chExt cx="993647" cy="1179271"/>
+              <a:off x="2369752" y="1606790"/>
+              <a:ext cx="993647" cy="1179272"/>
+              <a:chOff x="2369752" y="1606790"/>
+              <a:chExt cx="993647" cy="1179272"/>
             </a:xfrm>
           </p:grpSpPr>
           <p:sp>
@@ -3391,8 +3393,8 @@
             </p:nvSpPr>
             <p:spPr>
               <a:xfrm>
-                <a:off x="2371725" y="2366962"/>
-                <a:ext cx="942975" cy="419100"/>
+                <a:off x="2369752" y="2366962"/>
+                <a:ext cx="942976" cy="419100"/>
               </a:xfrm>
               <a:custGeom>
                 <a:avLst/>
@@ -3503,8 +3505,8 @@
             </p:nvSpPr>
             <p:spPr>
               <a:xfrm>
-                <a:off x="2581275" y="1606790"/>
-                <a:ext cx="784097" cy="969721"/>
+                <a:off x="2579302" y="1606790"/>
+                <a:ext cx="784097" cy="969720"/>
               </a:xfrm>
               <a:custGeom>
                 <a:avLst/>
@@ -3949,7 +3951,7 @@
           </p:blipFill>
           <p:spPr>
             <a:xfrm>
-              <a:off x="1880395" y="1348579"/>
+              <a:off x="1880395" y="1322102"/>
               <a:ext cx="648493" cy="648493"/>
             </a:xfrm>
             <a:prstGeom prst="ellipse">
@@ -3960,30 +3962,32 @@
       </p:grpSp>
       <p:grpSp>
         <p:nvGrpSpPr>
-          <p:cNvPr id="27" name="Group 26">
-            <a:extLst>
-              <a:ext uri="{FF2B5EF4-FFF2-40B4-BE49-F238E27FC236}">
-                <a16:creationId xmlns:a16="http://schemas.microsoft.com/office/drawing/2014/main" id="{C05C409A-75E3-F7D2-839E-8EBDD00EC8CD}"/>
-              </a:ext>
-            </a:extLst>
-          </p:cNvPr>
-          <p:cNvGrpSpPr/>
+          <p:cNvPr id="14" name="Group 13">
+            <a:extLst>
+              <a:ext uri="{FF2B5EF4-FFF2-40B4-BE49-F238E27FC236}">
+                <a16:creationId xmlns:a16="http://schemas.microsoft.com/office/drawing/2014/main" id="{DF036EA1-ACD3-FEF3-0E4D-1DE93F894181}"/>
+              </a:ext>
+            </a:extLst>
+          </p:cNvPr>
+          <p:cNvGrpSpPr>
+            <a:grpSpLocks noChangeAspect="1"/>
+          </p:cNvGrpSpPr>
           <p:nvPr/>
         </p:nvGrpSpPr>
         <p:grpSpPr>
           <a:xfrm>
-            <a:off x="4328320" y="1421604"/>
-            <a:ext cx="1484977" cy="1437483"/>
-            <a:chOff x="4328320" y="1421604"/>
-            <a:chExt cx="1484977" cy="1437483"/>
+            <a:off x="1506539" y="384966"/>
+            <a:ext cx="832863" cy="819817"/>
+            <a:chOff x="1880395" y="1322102"/>
+            <a:chExt cx="1487256" cy="1463960"/>
           </a:xfrm>
         </p:grpSpPr>
         <p:grpSp>
           <p:nvGrpSpPr>
-            <p:cNvPr id="18" name="Graphic 14">
+            <p:cNvPr id="15" name="Graphic 4">
               <a:extLst>
                 <a:ext uri="{FF2B5EF4-FFF2-40B4-BE49-F238E27FC236}">
-                  <a16:creationId xmlns:a16="http://schemas.microsoft.com/office/drawing/2014/main" id="{8D9FBAFA-0BDF-4588-2F08-076B83461443}"/>
+                  <a16:creationId xmlns:a16="http://schemas.microsoft.com/office/drawing/2014/main" id="{32EF6EE1-F836-F670-B4C7-250A8B00BF91}"/>
                 </a:ext>
               </a:extLst>
             </p:cNvPr>
@@ -3992,18 +3996,18 @@
           </p:nvGrpSpPr>
           <p:grpSpPr>
             <a:xfrm>
-              <a:off x="4819650" y="1679815"/>
-              <a:ext cx="993647" cy="1179271"/>
-              <a:chOff x="4819650" y="1679815"/>
-              <a:chExt cx="993647" cy="1179271"/>
+              <a:off x="2374004" y="1606790"/>
+              <a:ext cx="993647" cy="1179272"/>
+              <a:chOff x="2374004" y="1606790"/>
+              <a:chExt cx="993647" cy="1179272"/>
             </a:xfrm>
           </p:grpSpPr>
           <p:sp>
             <p:nvSpPr>
-              <p:cNvPr id="19" name="Freeform: Shape 18">
+              <p:cNvPr id="18" name="Freeform: Shape 17">
                 <a:extLst>
                   <a:ext uri="{FF2B5EF4-FFF2-40B4-BE49-F238E27FC236}">
-                    <a16:creationId xmlns:a16="http://schemas.microsoft.com/office/drawing/2014/main" id="{2837CE3A-897B-AE21-5175-678E2C0AC10B}"/>
+                    <a16:creationId xmlns:a16="http://schemas.microsoft.com/office/drawing/2014/main" id="{3288EF98-5863-21AF-981A-2C81CFDFB499}"/>
                   </a:ext>
                 </a:extLst>
               </p:cNvPr>
@@ -4012,8 +4016,8 @@
             </p:nvSpPr>
             <p:spPr>
               <a:xfrm>
-                <a:off x="4819650" y="2439987"/>
-                <a:ext cx="942975" cy="419100"/>
+                <a:off x="2374004" y="2366962"/>
+                <a:ext cx="942976" cy="419100"/>
               </a:xfrm>
               <a:custGeom>
                 <a:avLst/>
@@ -4112,10 +4116,10 @@
           </p:sp>
           <p:sp>
             <p:nvSpPr>
-              <p:cNvPr id="20" name="Freeform: Shape 19">
+              <p:cNvPr id="19" name="Freeform: Shape 18">
                 <a:extLst>
                   <a:ext uri="{FF2B5EF4-FFF2-40B4-BE49-F238E27FC236}">
-                    <a16:creationId xmlns:a16="http://schemas.microsoft.com/office/drawing/2014/main" id="{78020827-BC7D-EBFE-9A60-55A52095D82B}"/>
+                    <a16:creationId xmlns:a16="http://schemas.microsoft.com/office/drawing/2014/main" id="{484742F5-9C7C-71A2-0B45-3A4076082617}"/>
                   </a:ext>
                 </a:extLst>
               </p:cNvPr>
@@ -4124,8 +4128,8 @@
             </p:nvSpPr>
             <p:spPr>
               <a:xfrm>
-                <a:off x="5029200" y="1679815"/>
-                <a:ext cx="784097" cy="969721"/>
+                <a:off x="2583554" y="1606790"/>
+                <a:ext cx="784097" cy="969720"/>
               </a:xfrm>
               <a:custGeom>
                 <a:avLst/>
@@ -4371,7 +4375,7 @@
             <p:cNvPr id="16" name="Freeform: Shape 15">
               <a:extLst>
                 <a:ext uri="{FF2B5EF4-FFF2-40B4-BE49-F238E27FC236}">
-                  <a16:creationId xmlns:a16="http://schemas.microsoft.com/office/drawing/2014/main" id="{F14B4EE5-DB31-21AC-0618-EDD7AB6AF3EA}"/>
+                  <a16:creationId xmlns:a16="http://schemas.microsoft.com/office/drawing/2014/main" id="{6FAD6360-A7DA-CF7E-A0F1-ACD96172FA80}"/>
                 </a:ext>
               </a:extLst>
             </p:cNvPr>
@@ -4380,7 +4384,7 @@
           </p:nvSpPr>
           <p:spPr>
             <a:xfrm>
-              <a:off x="4437857" y="2059780"/>
+              <a:off x="1989932" y="1986755"/>
               <a:ext cx="410875" cy="799307"/>
             </a:xfrm>
             <a:custGeom>
@@ -4553,7 +4557,7 @@
             <p:cNvPr id="17" name="Graphic 16" descr="User with solid fill">
               <a:extLst>
                 <a:ext uri="{FF2B5EF4-FFF2-40B4-BE49-F238E27FC236}">
-                  <a16:creationId xmlns:a16="http://schemas.microsoft.com/office/drawing/2014/main" id="{4ABA8750-26DC-BBDE-D608-C7A0EBAB578F}"/>
+                  <a16:creationId xmlns:a16="http://schemas.microsoft.com/office/drawing/2014/main" id="{00C48D78-872C-4360-BE9F-A70EC4967DE1}"/>
                 </a:ext>
               </a:extLst>
             </p:cNvPr>
@@ -4579,7 +4583,7 @@
           </p:blipFill>
           <p:spPr>
             <a:xfrm>
-              <a:off x="4328320" y="1421604"/>
+              <a:off x="1880395" y="1322102"/>
               <a:ext cx="648493" cy="648493"/>
             </a:xfrm>
             <a:prstGeom prst="ellipse">

</xml_diff>

<commit_message>
updated icon size as accepted by chrome & edge
</commit_message>
<xml_diff>
--- a/Assets/Icons/StackMeFirst Logo.pptx
+++ b/Assets/Icons/StackMeFirst Logo.pptx
@@ -270,7 +270,7 @@
           <a:p>
             <a:fld id="{60B993C3-E494-4159-903B-7A5CD1CA6C54}" type="datetimeFigureOut">
               <a:rPr lang="en-US" smtClean="0"/>
-              <a:t>2022-July-03</a:t>
+              <a:t>2022-July-04</a:t>
             </a:fld>
             <a:endParaRPr lang="en-US"/>
           </a:p>
@@ -468,7 +468,7 @@
           <a:p>
             <a:fld id="{60B993C3-E494-4159-903B-7A5CD1CA6C54}" type="datetimeFigureOut">
               <a:rPr lang="en-US" smtClean="0"/>
-              <a:t>2022-July-03</a:t>
+              <a:t>2022-July-04</a:t>
             </a:fld>
             <a:endParaRPr lang="en-US"/>
           </a:p>
@@ -676,7 +676,7 @@
           <a:p>
             <a:fld id="{60B993C3-E494-4159-903B-7A5CD1CA6C54}" type="datetimeFigureOut">
               <a:rPr lang="en-US" smtClean="0"/>
-              <a:t>2022-July-03</a:t>
+              <a:t>2022-July-04</a:t>
             </a:fld>
             <a:endParaRPr lang="en-US"/>
           </a:p>
@@ -874,7 +874,7 @@
           <a:p>
             <a:fld id="{60B993C3-E494-4159-903B-7A5CD1CA6C54}" type="datetimeFigureOut">
               <a:rPr lang="en-US" smtClean="0"/>
-              <a:t>2022-July-03</a:t>
+              <a:t>2022-July-04</a:t>
             </a:fld>
             <a:endParaRPr lang="en-US"/>
           </a:p>
@@ -1149,7 +1149,7 @@
           <a:p>
             <a:fld id="{60B993C3-E494-4159-903B-7A5CD1CA6C54}" type="datetimeFigureOut">
               <a:rPr lang="en-US" smtClean="0"/>
-              <a:t>2022-July-03</a:t>
+              <a:t>2022-July-04</a:t>
             </a:fld>
             <a:endParaRPr lang="en-US"/>
           </a:p>
@@ -1414,7 +1414,7 @@
           <a:p>
             <a:fld id="{60B993C3-E494-4159-903B-7A5CD1CA6C54}" type="datetimeFigureOut">
               <a:rPr lang="en-US" smtClean="0"/>
-              <a:t>2022-July-03</a:t>
+              <a:t>2022-July-04</a:t>
             </a:fld>
             <a:endParaRPr lang="en-US"/>
           </a:p>
@@ -1826,7 +1826,7 @@
           <a:p>
             <a:fld id="{60B993C3-E494-4159-903B-7A5CD1CA6C54}" type="datetimeFigureOut">
               <a:rPr lang="en-US" smtClean="0"/>
-              <a:t>2022-July-03</a:t>
+              <a:t>2022-July-04</a:t>
             </a:fld>
             <a:endParaRPr lang="en-US"/>
           </a:p>
@@ -1967,7 +1967,7 @@
           <a:p>
             <a:fld id="{60B993C3-E494-4159-903B-7A5CD1CA6C54}" type="datetimeFigureOut">
               <a:rPr lang="en-US" smtClean="0"/>
-              <a:t>2022-July-03</a:t>
+              <a:t>2022-July-04</a:t>
             </a:fld>
             <a:endParaRPr lang="en-US"/>
           </a:p>
@@ -2080,7 +2080,7 @@
           <a:p>
             <a:fld id="{60B993C3-E494-4159-903B-7A5CD1CA6C54}" type="datetimeFigureOut">
               <a:rPr lang="en-US" smtClean="0"/>
-              <a:t>2022-July-03</a:t>
+              <a:t>2022-July-04</a:t>
             </a:fld>
             <a:endParaRPr lang="en-US"/>
           </a:p>
@@ -2391,7 +2391,7 @@
           <a:p>
             <a:fld id="{60B993C3-E494-4159-903B-7A5CD1CA6C54}" type="datetimeFigureOut">
               <a:rPr lang="en-US" smtClean="0"/>
-              <a:t>2022-July-03</a:t>
+              <a:t>2022-July-04</a:t>
             </a:fld>
             <a:endParaRPr lang="en-US"/>
           </a:p>
@@ -2679,7 +2679,7 @@
           <a:p>
             <a:fld id="{60B993C3-E494-4159-903B-7A5CD1CA6C54}" type="datetimeFigureOut">
               <a:rPr lang="en-US" smtClean="0"/>
-              <a:t>2022-July-03</a:t>
+              <a:t>2022-July-04</a:t>
             </a:fld>
             <a:endParaRPr lang="en-US"/>
           </a:p>
@@ -2920,7 +2920,7 @@
           <a:p>
             <a:fld id="{60B993C3-E494-4159-903B-7A5CD1CA6C54}" type="datetimeFigureOut">
               <a:rPr lang="en-US" smtClean="0"/>
-              <a:t>2022-July-03</a:t>
+              <a:t>2022-July-04</a:t>
             </a:fld>
             <a:endParaRPr lang="en-US"/>
           </a:p>
@@ -3353,10 +3353,10 @@
         </p:nvGrpSpPr>
         <p:grpSpPr>
           <a:xfrm>
-            <a:off x="375446" y="384966"/>
-            <a:ext cx="830482" cy="819817"/>
-            <a:chOff x="1880395" y="1322102"/>
-            <a:chExt cx="1483004" cy="1463960"/>
+            <a:off x="92078" y="56355"/>
+            <a:ext cx="276701" cy="273178"/>
+            <a:chOff x="1880395" y="1309230"/>
+            <a:chExt cx="1495876" cy="1476832"/>
           </a:xfrm>
         </p:grpSpPr>
         <p:grpSp>
@@ -3373,9 +3373,9 @@
           </p:nvGrpSpPr>
           <p:grpSpPr>
             <a:xfrm>
-              <a:off x="2369752" y="1606790"/>
+              <a:off x="2382624" y="1606790"/>
               <a:ext cx="993647" cy="1179272"/>
-              <a:chOff x="2369752" y="1606790"/>
+              <a:chOff x="2382624" y="1606790"/>
               <a:chExt cx="993647" cy="1179272"/>
             </a:xfrm>
           </p:grpSpPr>
@@ -3393,8 +3393,8 @@
             </p:nvSpPr>
             <p:spPr>
               <a:xfrm>
-                <a:off x="2369752" y="2366962"/>
-                <a:ext cx="942976" cy="419100"/>
+                <a:off x="2382624" y="2366964"/>
+                <a:ext cx="942976" cy="419098"/>
               </a:xfrm>
               <a:custGeom>
                 <a:avLst/>
@@ -3505,8 +3505,8 @@
             </p:nvSpPr>
             <p:spPr>
               <a:xfrm>
-                <a:off x="2579302" y="1606790"/>
-                <a:ext cx="784097" cy="969720"/>
+                <a:off x="2592175" y="1606790"/>
+                <a:ext cx="784096" cy="969720"/>
               </a:xfrm>
               <a:custGeom>
                 <a:avLst/>
@@ -3904,7 +3904,7 @@
             <a:solidFill>
               <a:schemeClr val="accent2"/>
             </a:solidFill>
-            <a:ln w="19050" cap="flat">
+            <a:ln w="6350" cap="flat">
               <a:solidFill>
                 <a:schemeClr val="accent2"/>
               </a:solidFill>
@@ -3951,8 +3951,8 @@
           </p:blipFill>
           <p:spPr>
             <a:xfrm>
-              <a:off x="1880395" y="1322102"/>
-              <a:ext cx="648493" cy="648493"/>
+              <a:off x="1880395" y="1309230"/>
+              <a:ext cx="648495" cy="648491"/>
             </a:xfrm>
             <a:prstGeom prst="ellipse">
               <a:avLst/>
@@ -3962,10 +3962,10 @@
       </p:grpSp>
       <p:grpSp>
         <p:nvGrpSpPr>
-          <p:cNvPr id="14" name="Group 13">
-            <a:extLst>
-              <a:ext uri="{FF2B5EF4-FFF2-40B4-BE49-F238E27FC236}">
-                <a16:creationId xmlns:a16="http://schemas.microsoft.com/office/drawing/2014/main" id="{DF036EA1-ACD3-FEF3-0E4D-1DE93F894181}"/>
+          <p:cNvPr id="20" name="Group 19">
+            <a:extLst>
+              <a:ext uri="{FF2B5EF4-FFF2-40B4-BE49-F238E27FC236}">
+                <a16:creationId xmlns:a16="http://schemas.microsoft.com/office/drawing/2014/main" id="{AC89BA78-0AE5-6FD7-88F1-FCC232FAF7DA}"/>
               </a:ext>
             </a:extLst>
           </p:cNvPr>
@@ -3976,18 +3976,18 @@
         </p:nvGrpSpPr>
         <p:grpSpPr>
           <a:xfrm>
-            <a:off x="1506539" y="384966"/>
-            <a:ext cx="832863" cy="819817"/>
-            <a:chOff x="1880395" y="1322102"/>
-            <a:chExt cx="1487256" cy="1463960"/>
+            <a:off x="511178" y="56355"/>
+            <a:ext cx="276701" cy="273178"/>
+            <a:chOff x="1880395" y="1309230"/>
+            <a:chExt cx="1495876" cy="1476832"/>
           </a:xfrm>
         </p:grpSpPr>
         <p:grpSp>
           <p:nvGrpSpPr>
-            <p:cNvPr id="15" name="Graphic 4">
+            <p:cNvPr id="21" name="Graphic 4">
               <a:extLst>
                 <a:ext uri="{FF2B5EF4-FFF2-40B4-BE49-F238E27FC236}">
-                  <a16:creationId xmlns:a16="http://schemas.microsoft.com/office/drawing/2014/main" id="{32EF6EE1-F836-F670-B4C7-250A8B00BF91}"/>
+                  <a16:creationId xmlns:a16="http://schemas.microsoft.com/office/drawing/2014/main" id="{5F90D4F4-C690-D3B7-B78B-4E2AB194D6F1}"/>
                 </a:ext>
               </a:extLst>
             </p:cNvPr>
@@ -3996,18 +3996,18 @@
           </p:nvGrpSpPr>
           <p:grpSpPr>
             <a:xfrm>
-              <a:off x="2374004" y="1606790"/>
+              <a:off x="2382624" y="1606790"/>
               <a:ext cx="993647" cy="1179272"/>
-              <a:chOff x="2374004" y="1606790"/>
+              <a:chOff x="2382624" y="1606790"/>
               <a:chExt cx="993647" cy="1179272"/>
             </a:xfrm>
           </p:grpSpPr>
           <p:sp>
             <p:nvSpPr>
-              <p:cNvPr id="18" name="Freeform: Shape 17">
+              <p:cNvPr id="28" name="Freeform: Shape 27">
                 <a:extLst>
                   <a:ext uri="{FF2B5EF4-FFF2-40B4-BE49-F238E27FC236}">
-                    <a16:creationId xmlns:a16="http://schemas.microsoft.com/office/drawing/2014/main" id="{3288EF98-5863-21AF-981A-2C81CFDFB499}"/>
+                    <a16:creationId xmlns:a16="http://schemas.microsoft.com/office/drawing/2014/main" id="{02DF7F2F-484E-0CC2-BD2D-830F9DA7078B}"/>
                   </a:ext>
                 </a:extLst>
               </p:cNvPr>
@@ -4016,8 +4016,8 @@
             </p:nvSpPr>
             <p:spPr>
               <a:xfrm>
-                <a:off x="2374004" y="2366962"/>
-                <a:ext cx="942976" cy="419100"/>
+                <a:off x="2382624" y="2366964"/>
+                <a:ext cx="942976" cy="419098"/>
               </a:xfrm>
               <a:custGeom>
                 <a:avLst/>
@@ -4116,10 +4116,10 @@
           </p:sp>
           <p:sp>
             <p:nvSpPr>
-              <p:cNvPr id="19" name="Freeform: Shape 18">
+              <p:cNvPr id="29" name="Freeform: Shape 28">
                 <a:extLst>
                   <a:ext uri="{FF2B5EF4-FFF2-40B4-BE49-F238E27FC236}">
-                    <a16:creationId xmlns:a16="http://schemas.microsoft.com/office/drawing/2014/main" id="{484742F5-9C7C-71A2-0B45-3A4076082617}"/>
+                    <a16:creationId xmlns:a16="http://schemas.microsoft.com/office/drawing/2014/main" id="{6897EF6F-CA5E-5D0F-33AE-5E2ACB1F685B}"/>
                   </a:ext>
                 </a:extLst>
               </p:cNvPr>
@@ -4128,8 +4128,8 @@
             </p:nvSpPr>
             <p:spPr>
               <a:xfrm>
-                <a:off x="2583554" y="1606790"/>
-                <a:ext cx="784097" cy="969720"/>
+                <a:off x="2592175" y="1606790"/>
+                <a:ext cx="784096" cy="969720"/>
               </a:xfrm>
               <a:custGeom>
                 <a:avLst/>
@@ -4372,10 +4372,10 @@
         </p:grpSp>
         <p:sp>
           <p:nvSpPr>
-            <p:cNvPr id="16" name="Freeform: Shape 15">
+            <p:cNvPr id="25" name="Freeform: Shape 24">
               <a:extLst>
                 <a:ext uri="{FF2B5EF4-FFF2-40B4-BE49-F238E27FC236}">
-                  <a16:creationId xmlns:a16="http://schemas.microsoft.com/office/drawing/2014/main" id="{6FAD6360-A7DA-CF7E-A0F1-ACD96172FA80}"/>
+                  <a16:creationId xmlns:a16="http://schemas.microsoft.com/office/drawing/2014/main" id="{A079AC84-C06E-9626-9C71-6C4D64D6B062}"/>
                 </a:ext>
               </a:extLst>
             </p:cNvPr>
@@ -4533,7 +4533,7 @@
                 <a:lumOff val="50000"/>
               </a:schemeClr>
             </a:solidFill>
-            <a:ln w="19050" cap="flat">
+            <a:ln w="6350" cap="flat">
               <a:solidFill>
                 <a:schemeClr val="tx1">
                   <a:lumMod val="50000"/>
@@ -4554,10 +4554,10 @@
         </p:sp>
         <p:pic>
           <p:nvPicPr>
-            <p:cNvPr id="17" name="Graphic 16" descr="User with solid fill">
+            <p:cNvPr id="27" name="Graphic 26" descr="User with solid fill">
               <a:extLst>
                 <a:ext uri="{FF2B5EF4-FFF2-40B4-BE49-F238E27FC236}">
-                  <a16:creationId xmlns:a16="http://schemas.microsoft.com/office/drawing/2014/main" id="{00C48D78-872C-4360-BE9F-A70EC4967DE1}"/>
+                  <a16:creationId xmlns:a16="http://schemas.microsoft.com/office/drawing/2014/main" id="{5D29D3A2-6D4E-F352-B399-35E880D3932E}"/>
                 </a:ext>
               </a:extLst>
             </p:cNvPr>
@@ -4583,8 +4583,8 @@
           </p:blipFill>
           <p:spPr>
             <a:xfrm>
-              <a:off x="1880395" y="1322102"/>
-              <a:ext cx="648493" cy="648493"/>
+              <a:off x="1880395" y="1309230"/>
+              <a:ext cx="648495" cy="648491"/>
             </a:xfrm>
             <a:prstGeom prst="ellipse">
               <a:avLst/>
@@ -4592,6 +4592,77 @@
           </p:spPr>
         </p:pic>
       </p:grpSp>
+      <p:sp>
+        <p:nvSpPr>
+          <p:cNvPr id="2" name="TextBox 1">
+            <a:extLst>
+              <a:ext uri="{FF2B5EF4-FFF2-40B4-BE49-F238E27FC236}">
+                <a16:creationId xmlns:a16="http://schemas.microsoft.com/office/drawing/2014/main" id="{ADBE5DF7-19B5-C390-EC65-C8E2D128849E}"/>
+              </a:ext>
+            </a:extLst>
+          </p:cNvPr>
+          <p:cNvSpPr txBox="1"/>
+          <p:nvPr/>
+        </p:nvSpPr>
+        <p:spPr>
+          <a:xfrm>
+            <a:off x="-62703" y="466207"/>
+            <a:ext cx="1800493" cy="169277"/>
+          </a:xfrm>
+          <a:prstGeom prst="rect">
+            <a:avLst/>
+          </a:prstGeom>
+          <a:noFill/>
+        </p:spPr>
+        <p:txBody>
+          <a:bodyPr wrap="none" rtlCol="0">
+            <a:spAutoFit/>
+          </a:bodyPr>
+          <a:lstStyle/>
+          <a:p>
+            <a:r>
+              <a:rPr lang="en-US" sz="500" dirty="0"/>
+              <a:t>This is 100px x 100px – only acceptable size by chrome &amp; Edge</a:t>
+            </a:r>
+          </a:p>
+        </p:txBody>
+      </p:sp>
+      <p:sp>
+        <p:nvSpPr>
+          <p:cNvPr id="3" name="TextBox 2">
+            <a:extLst>
+              <a:ext uri="{FF2B5EF4-FFF2-40B4-BE49-F238E27FC236}">
+                <a16:creationId xmlns:a16="http://schemas.microsoft.com/office/drawing/2014/main" id="{249E1996-60A3-545A-F744-671A60EE13E4}"/>
+              </a:ext>
+            </a:extLst>
+          </p:cNvPr>
+          <p:cNvSpPr txBox="1"/>
+          <p:nvPr/>
+        </p:nvSpPr>
+        <p:spPr>
+          <a:xfrm>
+            <a:off x="888588" y="28538"/>
+            <a:ext cx="1525161" cy="369332"/>
+          </a:xfrm>
+          <a:prstGeom prst="rect">
+            <a:avLst/>
+          </a:prstGeom>
+          <a:noFill/>
+        </p:spPr>
+        <p:txBody>
+          <a:bodyPr wrap="none" rtlCol="0">
+            <a:spAutoFit/>
+          </a:bodyPr>
+          <a:lstStyle/>
+          <a:p>
+            <a:r>
+              <a:rPr lang="en-US" dirty="0"/>
+              <a:t>100px x 100px</a:t>
+            </a:r>
+            <a:endParaRPr lang="en-US" sz="4800" dirty="0"/>
+          </a:p>
+        </p:txBody>
+      </p:sp>
     </p:spTree>
     <p:extLst>
       <p:ext uri="{BB962C8B-B14F-4D97-AF65-F5344CB8AC3E}">

</xml_diff>